<commit_message>
Polished it a bit more.
</commit_message>
<xml_diff>
--- a/DBAMetrics/DBAMetricsAndThePowerOfAutomation.pptx
+++ b/DBAMetrics/DBAMetricsAndThePowerOfAutomation.pptx
@@ -296,7 +296,7 @@
           <a:p>
             <a:fld id="{FE7420DB-F0CB-45F8-B63C-CDD5C4E503FF}" type="datetimeFigureOut">
               <a:rPr lang="en-US" smtClean="0"/>
-              <a:t>4/11/2013</a:t>
+              <a:t>4/13/2013</a:t>
             </a:fld>
             <a:endParaRPr lang="en-US"/>
           </a:p>
@@ -466,7 +466,7 @@
           <a:p>
             <a:fld id="{FE7420DB-F0CB-45F8-B63C-CDD5C4E503FF}" type="datetimeFigureOut">
               <a:rPr lang="en-US" smtClean="0"/>
-              <a:t>4/11/2013</a:t>
+              <a:t>4/13/2013</a:t>
             </a:fld>
             <a:endParaRPr lang="en-US"/>
           </a:p>
@@ -646,7 +646,7 @@
           <a:p>
             <a:fld id="{FE7420DB-F0CB-45F8-B63C-CDD5C4E503FF}" type="datetimeFigureOut">
               <a:rPr lang="en-US" smtClean="0"/>
-              <a:t>4/11/2013</a:t>
+              <a:t>4/13/2013</a:t>
             </a:fld>
             <a:endParaRPr lang="en-US"/>
           </a:p>
@@ -816,7 +816,7 @@
           <a:p>
             <a:fld id="{FE7420DB-F0CB-45F8-B63C-CDD5C4E503FF}" type="datetimeFigureOut">
               <a:rPr lang="en-US" smtClean="0"/>
-              <a:t>4/11/2013</a:t>
+              <a:t>4/13/2013</a:t>
             </a:fld>
             <a:endParaRPr lang="en-US"/>
           </a:p>
@@ -1062,7 +1062,7 @@
           <a:p>
             <a:fld id="{FE7420DB-F0CB-45F8-B63C-CDD5C4E503FF}" type="datetimeFigureOut">
               <a:rPr lang="en-US" smtClean="0"/>
-              <a:t>4/11/2013</a:t>
+              <a:t>4/13/2013</a:t>
             </a:fld>
             <a:endParaRPr lang="en-US"/>
           </a:p>
@@ -1350,7 +1350,7 @@
           <a:p>
             <a:fld id="{FE7420DB-F0CB-45F8-B63C-CDD5C4E503FF}" type="datetimeFigureOut">
               <a:rPr lang="en-US" smtClean="0"/>
-              <a:t>4/11/2013</a:t>
+              <a:t>4/13/2013</a:t>
             </a:fld>
             <a:endParaRPr lang="en-US"/>
           </a:p>
@@ -1772,7 +1772,7 @@
           <a:p>
             <a:fld id="{FE7420DB-F0CB-45F8-B63C-CDD5C4E503FF}" type="datetimeFigureOut">
               <a:rPr lang="en-US" smtClean="0"/>
-              <a:t>4/11/2013</a:t>
+              <a:t>4/13/2013</a:t>
             </a:fld>
             <a:endParaRPr lang="en-US"/>
           </a:p>
@@ -1890,7 +1890,7 @@
           <a:p>
             <a:fld id="{FE7420DB-F0CB-45F8-B63C-CDD5C4E503FF}" type="datetimeFigureOut">
               <a:rPr lang="en-US" smtClean="0"/>
-              <a:t>4/11/2013</a:t>
+              <a:t>4/13/2013</a:t>
             </a:fld>
             <a:endParaRPr lang="en-US"/>
           </a:p>
@@ -1985,7 +1985,7 @@
           <a:p>
             <a:fld id="{FE7420DB-F0CB-45F8-B63C-CDD5C4E503FF}" type="datetimeFigureOut">
               <a:rPr lang="en-US" smtClean="0"/>
-              <a:t>4/11/2013</a:t>
+              <a:t>4/13/2013</a:t>
             </a:fld>
             <a:endParaRPr lang="en-US"/>
           </a:p>
@@ -2262,7 +2262,7 @@
           <a:p>
             <a:fld id="{FE7420DB-F0CB-45F8-B63C-CDD5C4E503FF}" type="datetimeFigureOut">
               <a:rPr lang="en-US" smtClean="0"/>
-              <a:t>4/11/2013</a:t>
+              <a:t>4/13/2013</a:t>
             </a:fld>
             <a:endParaRPr lang="en-US"/>
           </a:p>
@@ -2515,7 +2515,7 @@
           <a:p>
             <a:fld id="{FE7420DB-F0CB-45F8-B63C-CDD5C4E503FF}" type="datetimeFigureOut">
               <a:rPr lang="en-US" smtClean="0"/>
-              <a:t>4/11/2013</a:t>
+              <a:t>4/13/2013</a:t>
             </a:fld>
             <a:endParaRPr lang="en-US"/>
           </a:p>
@@ -2728,7 +2728,7 @@
           <a:p>
             <a:fld id="{FE7420DB-F0CB-45F8-B63C-CDD5C4E503FF}" type="datetimeFigureOut">
               <a:rPr lang="en-US" smtClean="0"/>
-              <a:t>4/11/2013</a:t>
+              <a:t>4/13/2013</a:t>
             </a:fld>
             <a:endParaRPr lang="en-US"/>
           </a:p>
@@ -3203,6 +3203,13 @@
   <p:clrMapOvr>
     <a:masterClrMapping/>
   </p:clrMapOvr>
+  <p:timing>
+    <p:tnLst>
+      <p:par>
+        <p:cTn id="1" dur="indefinite" restart="never" nodeType="tmRoot"/>
+      </p:par>
+    </p:tnLst>
+  </p:timing>
 </p:sld>
 </file>
 
@@ -3306,6 +3313,13 @@
   <p:clrMapOvr>
     <a:masterClrMapping/>
   </p:clrMapOvr>
+  <p:timing>
+    <p:tnLst>
+      <p:par>
+        <p:cTn id="1" dur="indefinite" restart="never" nodeType="tmRoot"/>
+      </p:par>
+    </p:tnLst>
+  </p:timing>
 </p:sld>
 </file>
 
@@ -3364,72 +3378,53 @@
         <p:spPr/>
         <p:txBody>
           <a:bodyPr>
-            <a:normAutofit fontScale="92500" lnSpcReduction="20000"/>
+            <a:normAutofit lnSpcReduction="10000"/>
           </a:bodyPr>
           <a:lstStyle/>
           <a:p>
             <a:r>
               <a:rPr lang="en-US" dirty="0" smtClean="0"/>
-              <a:t>Have good metrics for space usage for a decent-sized DW project</a:t>
-            </a:r>
-          </a:p>
-          <a:p>
+              <a:t>Have good metrics for space usage for a decent-sized DW </a:t>
+            </a:r>
             <a:r>
               <a:rPr lang="en-US" dirty="0" smtClean="0"/>
-              <a:t>Third party tools considered:</a:t>
+              <a:t>project</a:t>
             </a:r>
           </a:p>
           <a:p>
             <a:pPr lvl="1"/>
             <a:r>
-              <a:rPr lang="en-US" dirty="0" err="1" smtClean="0"/>
-              <a:t>RedGate</a:t>
+              <a:rPr lang="en-US" dirty="0" smtClean="0"/>
+              <a:t>SAN</a:t>
+            </a:r>
+          </a:p>
+          <a:p>
+            <a:pPr lvl="1"/>
+            <a:r>
+              <a:rPr lang="en-US" dirty="0" smtClean="0"/>
+              <a:t>Mount points</a:t>
+            </a:r>
+          </a:p>
+          <a:p>
+            <a:pPr lvl="1"/>
+            <a:r>
+              <a:rPr lang="en-US" dirty="0" smtClean="0"/>
+              <a:t>Daily loads</a:t>
+            </a:r>
+          </a:p>
+          <a:p>
+            <a:pPr lvl="1"/>
+            <a:r>
+              <a:rPr lang="en-US" dirty="0" smtClean="0"/>
+              <a:t>Want to keep a record of space and row count changes</a:t>
             </a:r>
             <a:endParaRPr lang="en-US" dirty="0" smtClean="0"/>
           </a:p>
           <a:p>
-            <a:pPr lvl="1"/>
-            <a:r>
-              <a:rPr lang="en-US" dirty="0" err="1" smtClean="0"/>
-              <a:t>SQLSentry</a:t>
-            </a:r>
-            <a:endParaRPr lang="en-US" dirty="0" smtClean="0"/>
-          </a:p>
-          <a:p>
-            <a:pPr lvl="1"/>
-            <a:r>
-              <a:rPr lang="en-US" dirty="0" err="1" smtClean="0"/>
-              <a:t>MapToolKit</a:t>
-            </a:r>
-            <a:endParaRPr lang="en-US" dirty="0" smtClean="0"/>
-          </a:p>
-          <a:p>
             <a:r>
               <a:rPr lang="en-US" dirty="0" smtClean="0"/>
-              <a:t>but none of it is an option in the end:</a:t>
-            </a:r>
-          </a:p>
-          <a:p>
-            <a:pPr lvl="1"/>
-            <a:r>
-              <a:rPr lang="en-US" dirty="0" smtClean="0"/>
-              <a:t>Budget</a:t>
-            </a:r>
-          </a:p>
-          <a:p>
-            <a:pPr lvl="1"/>
-            <a:r>
-              <a:rPr lang="en-US" dirty="0" smtClean="0"/>
-              <a:t>Too cumbersome to use</a:t>
-            </a:r>
-            <a:endParaRPr lang="en-US" dirty="0" smtClean="0"/>
-          </a:p>
-          <a:p>
-            <a:r>
-              <a:rPr lang="en-US" dirty="0" smtClean="0"/>
-              <a:t>So I wrote my own</a:t>
-            </a:r>
-            <a:endParaRPr lang="en-US" dirty="0" smtClean="0"/>
+              <a:t>Those metrics will be used for trending, forecasting, capacity planning</a:t>
+            </a:r>
           </a:p>
         </p:txBody>
       </p:sp>
@@ -3443,6 +3438,13 @@
   <p:clrMapOvr>
     <a:masterClrMapping/>
   </p:clrMapOvr>
+  <p:timing>
+    <p:tnLst>
+      <p:par>
+        <p:cTn id="1" dur="indefinite" restart="never" nodeType="tmRoot"/>
+      </p:par>
+    </p:tnLst>
+  </p:timing>
 </p:sld>
 </file>
 
@@ -3504,27 +3506,61 @@
           <a:lstStyle/>
           <a:p>
             <a:r>
-              <a:rPr lang="en-US" dirty="0" smtClean="0"/>
-              <a:t>SAN</a:t>
-            </a:r>
-          </a:p>
-          <a:p>
-            <a:r>
-              <a:rPr lang="en-US" dirty="0" smtClean="0"/>
-              <a:t>Mount points</a:t>
-            </a:r>
-          </a:p>
-          <a:p>
-            <a:r>
-              <a:rPr lang="en-US" dirty="0" smtClean="0"/>
-              <a:t>Daily loads</a:t>
-            </a:r>
-          </a:p>
-          <a:p>
-            <a:r>
-              <a:rPr lang="en-US" dirty="0" smtClean="0"/>
-              <a:t>Want to keep a record of space and row count changes</a:t>
-            </a:r>
+              <a:rPr lang="en-US" dirty="0"/>
+              <a:t>Third party tools considered:</a:t>
+            </a:r>
+          </a:p>
+          <a:p>
+            <a:pPr lvl="1"/>
+            <a:r>
+              <a:rPr lang="en-US" dirty="0" err="1"/>
+              <a:t>RedGate</a:t>
+            </a:r>
+            <a:endParaRPr lang="en-US" dirty="0"/>
+          </a:p>
+          <a:p>
+            <a:pPr lvl="1"/>
+            <a:r>
+              <a:rPr lang="en-US" dirty="0" err="1"/>
+              <a:t>SQLSentry</a:t>
+            </a:r>
+            <a:endParaRPr lang="en-US" dirty="0"/>
+          </a:p>
+          <a:p>
+            <a:pPr lvl="1"/>
+            <a:r>
+              <a:rPr lang="en-US" dirty="0" err="1"/>
+              <a:t>MapToolKit</a:t>
+            </a:r>
+            <a:endParaRPr lang="en-US" dirty="0"/>
+          </a:p>
+          <a:p>
+            <a:r>
+              <a:rPr lang="en-US" dirty="0"/>
+              <a:t>but none of it is an option in the end:</a:t>
+            </a:r>
+          </a:p>
+          <a:p>
+            <a:pPr lvl="1"/>
+            <a:r>
+              <a:rPr lang="en-US" dirty="0"/>
+              <a:t>Budget</a:t>
+            </a:r>
+          </a:p>
+          <a:p>
+            <a:pPr lvl="1"/>
+            <a:r>
+              <a:rPr lang="en-US" dirty="0"/>
+              <a:t>Too cumbersome to use</a:t>
+            </a:r>
+          </a:p>
+          <a:p>
+            <a:r>
+              <a:rPr lang="en-US" dirty="0"/>
+              <a:t>So I wrote my own</a:t>
+            </a:r>
+          </a:p>
+          <a:p>
             <a:endParaRPr lang="en-US" dirty="0" smtClean="0"/>
           </a:p>
         </p:txBody>
@@ -3539,6 +3575,13 @@
   <p:clrMapOvr>
     <a:masterClrMapping/>
   </p:clrMapOvr>
+  <p:timing>
+    <p:tnLst>
+      <p:par>
+        <p:cTn id="1" dur="indefinite" restart="never" nodeType="tmRoot"/>
+      </p:par>
+    </p:tnLst>
+  </p:timing>
 </p:sld>
 </file>
 
@@ -3613,6 +3656,13 @@
   <p:clrMapOvr>
     <a:masterClrMapping/>
   </p:clrMapOvr>
+  <p:timing>
+    <p:tnLst>
+      <p:par>
+        <p:cTn id="1" dur="indefinite" restart="never" nodeType="tmRoot"/>
+      </p:par>
+    </p:tnLst>
+  </p:timing>
 </p:sld>
 </file>
 
@@ -3677,7 +3727,6 @@
               <a:rPr lang="en-US" dirty="0" smtClean="0"/>
               <a:t>Hopefully this shows you the power of automation</a:t>
             </a:r>
-            <a:endParaRPr lang="en-US" dirty="0" smtClean="0"/>
           </a:p>
         </p:txBody>
       </p:sp>
@@ -3691,6 +3740,13 @@
   <p:clrMapOvr>
     <a:masterClrMapping/>
   </p:clrMapOvr>
+  <p:timing>
+    <p:tnLst>
+      <p:par>
+        <p:cTn id="1" dur="indefinite" restart="never" nodeType="tmRoot"/>
+      </p:par>
+    </p:tnLst>
+  </p:timing>
 </p:sld>
 </file>
 
@@ -3781,7 +3837,6 @@
               <a:rPr lang="en-US" dirty="0" smtClean="0"/>
               <a:t>others</a:t>
             </a:r>
-            <a:endParaRPr lang="en-US" dirty="0" smtClean="0"/>
           </a:p>
         </p:txBody>
       </p:sp>
@@ -3795,6 +3850,13 @@
   <p:clrMapOvr>
     <a:masterClrMapping/>
   </p:clrMapOvr>
+  <p:timing>
+    <p:tnLst>
+      <p:par>
+        <p:cTn id="1" dur="indefinite" restart="never" nodeType="tmRoot"/>
+      </p:par>
+    </p:tnLst>
+  </p:timing>
 </p:sld>
 </file>
 
@@ -3865,7 +3927,17 @@
           <a:p>
             <a:r>
               <a:rPr lang="en-US" dirty="0" smtClean="0"/>
-              <a:t>Use the one that fits both you and your company</a:t>
+              <a:t>Use the one that fits both you and your </a:t>
+            </a:r>
+            <a:r>
+              <a:rPr lang="en-US" dirty="0" smtClean="0"/>
+              <a:t>company</a:t>
+            </a:r>
+          </a:p>
+          <a:p>
+            <a:r>
+              <a:rPr lang="en-US" dirty="0" smtClean="0"/>
+              <a:t>PowerShell is pretty compelling because it is on Windows by default and ready to go</a:t>
             </a:r>
             <a:endParaRPr lang="en-US" dirty="0" smtClean="0"/>
           </a:p>
@@ -3881,6 +3953,13 @@
   <p:clrMapOvr>
     <a:masterClrMapping/>
   </p:clrMapOvr>
+  <p:timing>
+    <p:tnLst>
+      <p:par>
+        <p:cTn id="1" dur="indefinite" restart="never" nodeType="tmRoot"/>
+      </p:par>
+    </p:tnLst>
+  </p:timing>
 </p:sld>
 </file>
 
@@ -3947,7 +4026,6 @@
               <a:rPr lang="en-US" dirty="0" smtClean="0"/>
               <a:t>Google</a:t>
             </a:r>
-            <a:endParaRPr lang="en-US" dirty="0" smtClean="0"/>
           </a:p>
           <a:p>
             <a:r>
@@ -3961,8 +4039,22 @@
           <a:p>
             <a:r>
               <a:rPr lang="en-US" dirty="0" smtClean="0"/>
-              <a:t>Email: Haidong.Ji@gmail.com</a:t>
-            </a:r>
+              <a:t>Email</a:t>
+            </a:r>
+            <a:r>
+              <a:rPr lang="en-US" smtClean="0"/>
+              <a:t>: </a:t>
+            </a:r>
+            <a:r>
+              <a:rPr lang="en-US" smtClean="0">
+                <a:hlinkClick r:id="rId3"/>
+              </a:rPr>
+              <a:t>Haidong.Ji@gmail.com</a:t>
+            </a:r>
+            <a:endParaRPr lang="en-US" smtClean="0"/>
+          </a:p>
+          <a:p>
+            <a:endParaRPr lang="en-US" dirty="0" smtClean="0"/>
           </a:p>
         </p:txBody>
       </p:sp>
@@ -3976,6 +4068,13 @@
   <p:clrMapOvr>
     <a:masterClrMapping/>
   </p:clrMapOvr>
+  <p:timing>
+    <p:tnLst>
+      <p:par>
+        <p:cTn id="1" dur="indefinite" restart="never" nodeType="tmRoot"/>
+      </p:par>
+    </p:tnLst>
+  </p:timing>
 </p:sld>
 </file>
 

</xml_diff>

<commit_message>
Added direct URL to DBAMetrics on github
</commit_message>
<xml_diff>
--- a/DBAMetrics/DBAMetricsAndThePowerOfAutomation.pptx
+++ b/DBAMetrics/DBAMetricsAndThePowerOfAutomation.pptx
@@ -3384,11 +3384,7 @@
           <a:p>
             <a:r>
               <a:rPr lang="en-US" dirty="0" smtClean="0"/>
-              <a:t>Have good metrics for space usage for a decent-sized DW </a:t>
-            </a:r>
-            <a:r>
-              <a:rPr lang="en-US" dirty="0" smtClean="0"/>
-              <a:t>project</a:t>
+              <a:t>Have good metrics for space usage for a decent-sized DW project</a:t>
             </a:r>
           </a:p>
           <a:p>
@@ -3418,7 +3414,6 @@
               <a:rPr lang="en-US" dirty="0" smtClean="0"/>
               <a:t>Want to keep a record of space and row count changes</a:t>
             </a:r>
-            <a:endParaRPr lang="en-US" dirty="0" smtClean="0"/>
           </a:p>
           <a:p>
             <a:r>
@@ -3927,11 +3922,7 @@
           <a:p>
             <a:r>
               <a:rPr lang="en-US" dirty="0" smtClean="0"/>
-              <a:t>Use the one that fits both you and your </a:t>
-            </a:r>
-            <a:r>
-              <a:rPr lang="en-US" dirty="0" smtClean="0"/>
-              <a:t>company</a:t>
+              <a:t>Use the one that fits both you and your company</a:t>
             </a:r>
           </a:p>
           <a:p>
@@ -3939,7 +3930,6 @@
               <a:rPr lang="en-US" dirty="0" smtClean="0"/>
               <a:t>PowerShell is pretty compelling because it is on Windows by default and ready to go</a:t>
             </a:r>
-            <a:endParaRPr lang="en-US" dirty="0" smtClean="0"/>
           </a:p>
         </p:txBody>
       </p:sp>
@@ -4029,10 +4019,16 @@
           </a:p>
           <a:p>
             <a:r>
+              <a:rPr lang="en-US" dirty="0">
+                <a:hlinkClick r:id="rId2"/>
+              </a:rPr>
+              <a:t>https://</a:t>
+            </a:r>
+            <a:r>
               <a:rPr lang="en-US" dirty="0" smtClean="0">
                 <a:hlinkClick r:id="rId2"/>
               </a:rPr>
-              <a:t>http://github.com/haidong</a:t>
+              <a:t>github.com/haidong/mssqlps/tree/master/DBAMetrics</a:t>
             </a:r>
             <a:endParaRPr lang="en-US" dirty="0" smtClean="0"/>
           </a:p>
@@ -4042,16 +4038,16 @@
               <a:t>Email</a:t>
             </a:r>
             <a:r>
-              <a:rPr lang="en-US" smtClean="0"/>
+              <a:rPr lang="en-US" dirty="0" smtClean="0"/>
               <a:t>: </a:t>
             </a:r>
             <a:r>
-              <a:rPr lang="en-US" smtClean="0">
+              <a:rPr lang="en-US" dirty="0" smtClean="0">
                 <a:hlinkClick r:id="rId3"/>
               </a:rPr>
               <a:t>Haidong.Ji@gmail.com</a:t>
             </a:r>
-            <a:endParaRPr lang="en-US" smtClean="0"/>
+            <a:endParaRPr lang="en-US" dirty="0" smtClean="0"/>
           </a:p>
           <a:p>
             <a:endParaRPr lang="en-US" dirty="0" smtClean="0"/>

</xml_diff>